<commit_message>
New objects and jsps
</commit_message>
<xml_diff>
--- a/UML-Classes.pptx
+++ b/UML-Classes.pptx
@@ -290,7 +290,7 @@
             <a:fld id="{7B000160-B9DB-4F58-9099-F3647EEEF01A}" type="datetimeFigureOut">
               <a:rPr lang="en-US" smtClean="0"/>
               <a:pPr/>
-              <a:t>5/2/2014</a:t>
+              <a:t>5/8/2014</a:t>
             </a:fld>
             <a:endParaRPr lang="en-US"/>
           </a:p>
@@ -457,7 +457,7 @@
             <a:fld id="{7B000160-B9DB-4F58-9099-F3647EEEF01A}" type="datetimeFigureOut">
               <a:rPr lang="en-US" smtClean="0"/>
               <a:pPr/>
-              <a:t>5/2/2014</a:t>
+              <a:t>5/8/2014</a:t>
             </a:fld>
             <a:endParaRPr lang="en-US"/>
           </a:p>
@@ -634,7 +634,7 @@
             <a:fld id="{7B000160-B9DB-4F58-9099-F3647EEEF01A}" type="datetimeFigureOut">
               <a:rPr lang="en-US" smtClean="0"/>
               <a:pPr/>
-              <a:t>5/2/2014</a:t>
+              <a:t>5/8/2014</a:t>
             </a:fld>
             <a:endParaRPr lang="en-US"/>
           </a:p>
@@ -801,7 +801,7 @@
             <a:fld id="{7B000160-B9DB-4F58-9099-F3647EEEF01A}" type="datetimeFigureOut">
               <a:rPr lang="en-US" smtClean="0"/>
               <a:pPr/>
-              <a:t>5/2/2014</a:t>
+              <a:t>5/8/2014</a:t>
             </a:fld>
             <a:endParaRPr lang="en-US"/>
           </a:p>
@@ -1044,7 +1044,7 @@
             <a:fld id="{7B000160-B9DB-4F58-9099-F3647EEEF01A}" type="datetimeFigureOut">
               <a:rPr lang="en-US" smtClean="0"/>
               <a:pPr/>
-              <a:t>5/2/2014</a:t>
+              <a:t>5/8/2014</a:t>
             </a:fld>
             <a:endParaRPr lang="en-US"/>
           </a:p>
@@ -1329,7 +1329,7 @@
             <a:fld id="{7B000160-B9DB-4F58-9099-F3647EEEF01A}" type="datetimeFigureOut">
               <a:rPr lang="en-US" smtClean="0"/>
               <a:pPr/>
-              <a:t>5/2/2014</a:t>
+              <a:t>5/8/2014</a:t>
             </a:fld>
             <a:endParaRPr lang="en-US"/>
           </a:p>
@@ -1748,7 +1748,7 @@
             <a:fld id="{7B000160-B9DB-4F58-9099-F3647EEEF01A}" type="datetimeFigureOut">
               <a:rPr lang="en-US" smtClean="0"/>
               <a:pPr/>
-              <a:t>5/2/2014</a:t>
+              <a:t>5/8/2014</a:t>
             </a:fld>
             <a:endParaRPr lang="en-US"/>
           </a:p>
@@ -1863,7 +1863,7 @@
             <a:fld id="{7B000160-B9DB-4F58-9099-F3647EEEF01A}" type="datetimeFigureOut">
               <a:rPr lang="en-US" smtClean="0"/>
               <a:pPr/>
-              <a:t>5/2/2014</a:t>
+              <a:t>5/8/2014</a:t>
             </a:fld>
             <a:endParaRPr lang="en-US"/>
           </a:p>
@@ -1955,7 +1955,7 @@
             <a:fld id="{7B000160-B9DB-4F58-9099-F3647EEEF01A}" type="datetimeFigureOut">
               <a:rPr lang="en-US" smtClean="0"/>
               <a:pPr/>
-              <a:t>5/2/2014</a:t>
+              <a:t>5/8/2014</a:t>
             </a:fld>
             <a:endParaRPr lang="en-US"/>
           </a:p>
@@ -2229,7 +2229,7 @@
             <a:fld id="{7B000160-B9DB-4F58-9099-F3647EEEF01A}" type="datetimeFigureOut">
               <a:rPr lang="en-US" smtClean="0"/>
               <a:pPr/>
-              <a:t>5/2/2014</a:t>
+              <a:t>5/8/2014</a:t>
             </a:fld>
             <a:endParaRPr lang="en-US"/>
           </a:p>
@@ -2479,7 +2479,7 @@
             <a:fld id="{7B000160-B9DB-4F58-9099-F3647EEEF01A}" type="datetimeFigureOut">
               <a:rPr lang="en-US" smtClean="0"/>
               <a:pPr/>
-              <a:t>5/2/2014</a:t>
+              <a:t>5/8/2014</a:t>
             </a:fld>
             <a:endParaRPr lang="en-US"/>
           </a:p>
@@ -2689,7 +2689,7 @@
             <a:fld id="{7B000160-B9DB-4F58-9099-F3647EEEF01A}" type="datetimeFigureOut">
               <a:rPr lang="en-US" smtClean="0"/>
               <a:pPr/>
-              <a:t>5/2/2014</a:t>
+              <a:t>5/8/2014</a:t>
             </a:fld>
             <a:endParaRPr lang="en-US"/>
           </a:p>
@@ -4526,7 +4526,6 @@
               <a:rPr lang="en-US" sz="900" b="1" dirty="0" smtClean="0"/>
               <a:t>;</a:t>
             </a:r>
-            <a:endParaRPr lang="en-US" sz="900" b="1" dirty="0" smtClean="0"/>
           </a:p>
           <a:p>
             <a:r>
@@ -4571,7 +4570,6 @@
               <a:rPr lang="en-US" sz="900" b="1" dirty="0" smtClean="0"/>
               <a:t>;</a:t>
             </a:r>
-            <a:endParaRPr lang="en-US" sz="900" b="1" dirty="0" smtClean="0"/>
           </a:p>
         </p:txBody>
       </p:sp>
@@ -4881,7 +4879,7 @@
         <p:spPr>
           <a:xfrm>
             <a:off x="4932040" y="1525141"/>
-            <a:ext cx="3432350" cy="1615827"/>
+            <a:ext cx="3432350" cy="1477328"/>
           </a:xfrm>
           <a:prstGeom prst="rect">
             <a:avLst/>
@@ -5035,48 +5033,23 @@
               <a:t>private </a:t>
             </a:r>
             <a:r>
-              <a:rPr lang="en-US" sz="900" b="1" dirty="0" err="1"/>
-              <a:t>boolean</a:t>
-            </a:r>
-            <a:r>
-              <a:rPr lang="en-US" sz="900" b="1" dirty="0"/>
-              <a:t> </a:t>
-            </a:r>
-            <a:r>
-              <a:rPr lang="en-US" sz="900" b="1" dirty="0" err="1"/>
-              <a:t>multipleASesDilemma</a:t>
-            </a:r>
-            <a:r>
-              <a:rPr lang="en-US" sz="900" b="1" dirty="0"/>
-              <a:t>;</a:t>
-            </a:r>
-          </a:p>
-          <a:p>
-            <a:r>
-              <a:rPr lang="en-US" sz="900" b="1" dirty="0"/>
+              <a:rPr lang="en-US" sz="900" b="1" dirty="0" err="1" smtClean="0"/>
+              <a:t>int</a:t>
+            </a:r>
+            <a:r>
+              <a:rPr lang="en-US" sz="900" b="1" smtClean="0"/>
+              <a:t> flags;</a:t>
+            </a:r>
+            <a:endParaRPr lang="en-US" sz="900" b="1" dirty="0"/>
+          </a:p>
+          <a:p>
+            <a:r>
+              <a:rPr lang="en-US" sz="900" b="1" dirty="0" smtClean="0"/>
               <a:t>private </a:t>
             </a:r>
             <a:r>
-              <a:rPr lang="en-US" sz="900" b="1" dirty="0" err="1"/>
-              <a:t>boolean</a:t>
-            </a:r>
-            <a:r>
-              <a:rPr lang="en-US" sz="900" b="1" dirty="0"/>
-              <a:t> </a:t>
-            </a:r>
-            <a:r>
-              <a:rPr lang="en-US" sz="900" b="1" dirty="0" err="1"/>
-              <a:t>multipleASesDilemmaCorrected</a:t>
-            </a:r>
-            <a:r>
-              <a:rPr lang="en-US" sz="900" b="1" dirty="0"/>
-              <a:t>;</a:t>
-            </a:r>
-          </a:p>
-          <a:p>
-            <a:r>
-              <a:rPr lang="en-US" sz="900" b="1" dirty="0"/>
-              <a:t>private List&lt;</a:t>
+              <a:rPr lang="en-US" sz="900" b="1" dirty="0"/>
+              <a:t>List&lt;</a:t>
             </a:r>
             <a:r>
               <a:rPr lang="en-US" sz="900" b="1" dirty="0" err="1"/>
@@ -5343,11 +5316,7 @@
             </a:r>
             <a:r>
               <a:rPr lang="en-US" sz="1050" dirty="0" err="1" smtClean="0"/>
-              <a:t>t</a:t>
-            </a:r>
-            <a:r>
-              <a:rPr lang="en-US" sz="1050" dirty="0" err="1" smtClean="0"/>
-              <a:t>racerouteASes</a:t>
+              <a:t>tracerouteASes</a:t>
             </a:r>
             <a:r>
               <a:rPr lang="en-US" sz="1050" dirty="0" smtClean="0"/>
@@ -5363,11 +5332,7 @@
             </a:r>
             <a:r>
               <a:rPr lang="en-US" sz="1050" dirty="0" err="1" smtClean="0"/>
-              <a:t>T</a:t>
-            </a:r>
-            <a:r>
-              <a:rPr lang="en-US" sz="1050" dirty="0" err="1" smtClean="0"/>
-              <a:t>racerouteASPath</a:t>
+              <a:t>TracerouteASPath</a:t>
             </a:r>
             <a:r>
               <a:rPr lang="en-US" sz="1050" dirty="0" smtClean="0"/>

</xml_diff>

<commit_message>
modified JSON Date in ISO 8601 format
</commit_message>
<xml_diff>
--- a/UML-Classes.pptx
+++ b/UML-Classes.pptx
@@ -290,7 +290,7 @@
             <a:fld id="{7B000160-B9DB-4F58-9099-F3647EEEF01A}" type="datetimeFigureOut">
               <a:rPr lang="en-US" smtClean="0"/>
               <a:pPr/>
-              <a:t>5/8/2014</a:t>
+              <a:t>5/9/2014</a:t>
             </a:fld>
             <a:endParaRPr lang="en-US"/>
           </a:p>
@@ -457,7 +457,7 @@
             <a:fld id="{7B000160-B9DB-4F58-9099-F3647EEEF01A}" type="datetimeFigureOut">
               <a:rPr lang="en-US" smtClean="0"/>
               <a:pPr/>
-              <a:t>5/8/2014</a:t>
+              <a:t>5/9/2014</a:t>
             </a:fld>
             <a:endParaRPr lang="en-US"/>
           </a:p>
@@ -634,7 +634,7 @@
             <a:fld id="{7B000160-B9DB-4F58-9099-F3647EEEF01A}" type="datetimeFigureOut">
               <a:rPr lang="en-US" smtClean="0"/>
               <a:pPr/>
-              <a:t>5/8/2014</a:t>
+              <a:t>5/9/2014</a:t>
             </a:fld>
             <a:endParaRPr lang="en-US"/>
           </a:p>
@@ -801,7 +801,7 @@
             <a:fld id="{7B000160-B9DB-4F58-9099-F3647EEEF01A}" type="datetimeFigureOut">
               <a:rPr lang="en-US" smtClean="0"/>
               <a:pPr/>
-              <a:t>5/8/2014</a:t>
+              <a:t>5/9/2014</a:t>
             </a:fld>
             <a:endParaRPr lang="en-US"/>
           </a:p>
@@ -1044,7 +1044,7 @@
             <a:fld id="{7B000160-B9DB-4F58-9099-F3647EEEF01A}" type="datetimeFigureOut">
               <a:rPr lang="en-US" smtClean="0"/>
               <a:pPr/>
-              <a:t>5/8/2014</a:t>
+              <a:t>5/9/2014</a:t>
             </a:fld>
             <a:endParaRPr lang="en-US"/>
           </a:p>
@@ -1329,7 +1329,7 @@
             <a:fld id="{7B000160-B9DB-4F58-9099-F3647EEEF01A}" type="datetimeFigureOut">
               <a:rPr lang="en-US" smtClean="0"/>
               <a:pPr/>
-              <a:t>5/8/2014</a:t>
+              <a:t>5/9/2014</a:t>
             </a:fld>
             <a:endParaRPr lang="en-US"/>
           </a:p>
@@ -1748,7 +1748,7 @@
             <a:fld id="{7B000160-B9DB-4F58-9099-F3647EEEF01A}" type="datetimeFigureOut">
               <a:rPr lang="en-US" smtClean="0"/>
               <a:pPr/>
-              <a:t>5/8/2014</a:t>
+              <a:t>5/9/2014</a:t>
             </a:fld>
             <a:endParaRPr lang="en-US"/>
           </a:p>
@@ -1863,7 +1863,7 @@
             <a:fld id="{7B000160-B9DB-4F58-9099-F3647EEEF01A}" type="datetimeFigureOut">
               <a:rPr lang="en-US" smtClean="0"/>
               <a:pPr/>
-              <a:t>5/8/2014</a:t>
+              <a:t>5/9/2014</a:t>
             </a:fld>
             <a:endParaRPr lang="en-US"/>
           </a:p>
@@ -1955,7 +1955,7 @@
             <a:fld id="{7B000160-B9DB-4F58-9099-F3647EEEF01A}" type="datetimeFigureOut">
               <a:rPr lang="en-US" smtClean="0"/>
               <a:pPr/>
-              <a:t>5/8/2014</a:t>
+              <a:t>5/9/2014</a:t>
             </a:fld>
             <a:endParaRPr lang="en-US"/>
           </a:p>
@@ -2229,7 +2229,7 @@
             <a:fld id="{7B000160-B9DB-4F58-9099-F3647EEEF01A}" type="datetimeFigureOut">
               <a:rPr lang="en-US" smtClean="0"/>
               <a:pPr/>
-              <a:t>5/8/2014</a:t>
+              <a:t>5/9/2014</a:t>
             </a:fld>
             <a:endParaRPr lang="en-US"/>
           </a:p>
@@ -2479,7 +2479,7 @@
             <a:fld id="{7B000160-B9DB-4F58-9099-F3647EEEF01A}" type="datetimeFigureOut">
               <a:rPr lang="en-US" smtClean="0"/>
               <a:pPr/>
-              <a:t>5/8/2014</a:t>
+              <a:t>5/9/2014</a:t>
             </a:fld>
             <a:endParaRPr lang="en-US"/>
           </a:p>
@@ -2689,7 +2689,7 @@
             <a:fld id="{7B000160-B9DB-4F58-9099-F3647EEEF01A}" type="datetimeFigureOut">
               <a:rPr lang="en-US" smtClean="0"/>
               <a:pPr/>
-              <a:t>5/8/2014</a:t>
+              <a:t>5/9/2014</a:t>
             </a:fld>
             <a:endParaRPr lang="en-US"/>
           </a:p>
@@ -4026,7 +4026,7 @@
         <p:spPr>
           <a:xfrm>
             <a:off x="2051720" y="4941168"/>
-            <a:ext cx="2420856" cy="1754326"/>
+            <a:ext cx="3666388" cy="1754326"/>
           </a:xfrm>
           <a:prstGeom prst="rect">
             <a:avLst/>
@@ -4080,8 +4080,12 @@
           </a:p>
           <a:p>
             <a:r>
+              <a:rPr lang="en-US" sz="900" i="1" dirty="0" smtClean="0"/>
+              <a:t>ECHO_REPLY, UNKNOWN, TIME_EXCEEDED</a:t>
+            </a:r>
+            <a:r>
               <a:rPr lang="en-US" sz="900" i="1" dirty="0"/>
-              <a:t>TIME_EXCEEDED, DESTINATION_UNREACHABLE</a:t>
+              <a:t>, DESTINATION_UNREACHABLE</a:t>
             </a:r>
           </a:p>
           <a:p>
@@ -4879,7 +4883,7 @@
         <p:spPr>
           <a:xfrm>
             <a:off x="4932040" y="1525141"/>
-            <a:ext cx="3432350" cy="1477328"/>
+            <a:ext cx="1519968" cy="1338828"/>
           </a:xfrm>
           <a:prstGeom prst="rect">
             <a:avLst/>
@@ -5037,37 +5041,14 @@
               <a:t>int</a:t>
             </a:r>
             <a:r>
-              <a:rPr lang="en-US" sz="900" b="1" smtClean="0"/>
-              <a:t> flags;</a:t>
+              <a:rPr lang="en-US" sz="900" b="1" dirty="0" smtClean="0"/>
+              <a:t> flags</a:t>
+            </a:r>
+            <a:r>
+              <a:rPr lang="en-US" sz="900" b="1" dirty="0" smtClean="0"/>
+              <a:t>;</a:t>
             </a:r>
             <a:endParaRPr lang="en-US" sz="900" b="1" dirty="0"/>
-          </a:p>
-          <a:p>
-            <a:r>
-              <a:rPr lang="en-US" sz="900" b="1" dirty="0" smtClean="0"/>
-              <a:t>private </a:t>
-            </a:r>
-            <a:r>
-              <a:rPr lang="en-US" sz="900" b="1" dirty="0"/>
-              <a:t>List&lt;</a:t>
-            </a:r>
-            <a:r>
-              <a:rPr lang="en-US" sz="900" b="1" dirty="0" err="1"/>
-              <a:t>TracerouteASRelationship</a:t>
-            </a:r>
-            <a:r>
-              <a:rPr lang="en-US" sz="900" b="1" dirty="0"/>
-              <a:t>&gt; </a:t>
-            </a:r>
-            <a:r>
-              <a:rPr lang="en-US" sz="900" b="1" dirty="0" err="1"/>
-              <a:t>tracerouteASRelationships</a:t>
-            </a:r>
-            <a:r>
-              <a:rPr lang="en-US" sz="900" b="1" dirty="0"/>
-              <a:t>;</a:t>
-            </a:r>
-            <a:endParaRPr lang="en-US" sz="900" dirty="0"/>
           </a:p>
         </p:txBody>
       </p:sp>

</xml_diff>